<commit_message>
Theme and password change
</commit_message>
<xml_diff>
--- a/Электронный журнал.pptx
+++ b/Электронный журнал.pptx
@@ -396,7 +396,7 @@
           <a:p>
             <a:fld id="{437E8BF7-1471-48EA-A6B7-2B9BF496E98F}" type="datetimeFigureOut">
               <a:rPr lang="ru-RU" smtClean="0"/>
-              <a:t>26.04.2021</a:t>
+              <a:t>19.10.2021</a:t>
             </a:fld>
             <a:endParaRPr lang="ru-RU"/>
           </a:p>
@@ -789,7 +789,7 @@
           <a:p>
             <a:fld id="{437E8BF7-1471-48EA-A6B7-2B9BF496E98F}" type="datetimeFigureOut">
               <a:rPr lang="ru-RU" smtClean="0"/>
-              <a:t>26.04.2021</a:t>
+              <a:t>19.10.2021</a:t>
             </a:fld>
             <a:endParaRPr lang="ru-RU"/>
           </a:p>
@@ -1321,7 +1321,7 @@
           <a:p>
             <a:fld id="{437E8BF7-1471-48EA-A6B7-2B9BF496E98F}" type="datetimeFigureOut">
               <a:rPr lang="ru-RU" smtClean="0"/>
-              <a:t>26.04.2021</a:t>
+              <a:t>19.10.2021</a:t>
             </a:fld>
             <a:endParaRPr lang="ru-RU"/>
           </a:p>
@@ -1454,7 +1454,7 @@
           <a:p>
             <a:fld id="{437E8BF7-1471-48EA-A6B7-2B9BF496E98F}" type="datetimeFigureOut">
               <a:rPr lang="ru-RU" smtClean="0"/>
-              <a:t>26.04.2021</a:t>
+              <a:t>19.10.2021</a:t>
             </a:fld>
             <a:endParaRPr lang="ru-RU"/>
           </a:p>
@@ -1997,7 +1997,7 @@
           <a:p>
             <a:fld id="{437E8BF7-1471-48EA-A6B7-2B9BF496E98F}" type="datetimeFigureOut">
               <a:rPr lang="ru-RU" smtClean="0"/>
-              <a:t>26.04.2021</a:t>
+              <a:t>19.10.2021</a:t>
             </a:fld>
             <a:endParaRPr lang="ru-RU"/>
           </a:p>
@@ -2292,7 +2292,7 @@
           <a:p>
             <a:fld id="{437E8BF7-1471-48EA-A6B7-2B9BF496E98F}" type="datetimeFigureOut">
               <a:rPr lang="ru-RU" smtClean="0"/>
-              <a:t>26.04.2021</a:t>
+              <a:t>19.10.2021</a:t>
             </a:fld>
             <a:endParaRPr lang="ru-RU"/>
           </a:p>
@@ -2951,7 +2951,7 @@
           <a:p>
             <a:fld id="{437E8BF7-1471-48EA-A6B7-2B9BF496E98F}" type="datetimeFigureOut">
               <a:rPr lang="ru-RU" smtClean="0"/>
-              <a:t>26.04.2021</a:t>
+              <a:t>19.10.2021</a:t>
             </a:fld>
             <a:endParaRPr lang="ru-RU"/>
           </a:p>
@@ -3387,7 +3387,7 @@
           <a:p>
             <a:fld id="{437E8BF7-1471-48EA-A6B7-2B9BF496E98F}" type="datetimeFigureOut">
               <a:rPr lang="ru-RU" smtClean="0"/>
-              <a:t>26.04.2021</a:t>
+              <a:t>19.10.2021</a:t>
             </a:fld>
             <a:endParaRPr lang="ru-RU"/>
           </a:p>
@@ -3700,7 +3700,7 @@
           <a:p>
             <a:fld id="{437E8BF7-1471-48EA-A6B7-2B9BF496E98F}" type="datetimeFigureOut">
               <a:rPr lang="ru-RU" smtClean="0"/>
-              <a:t>26.04.2021</a:t>
+              <a:t>19.10.2021</a:t>
             </a:fld>
             <a:endParaRPr lang="ru-RU"/>
           </a:p>
@@ -4432,7 +4432,7 @@
           <a:p>
             <a:fld id="{437E8BF7-1471-48EA-A6B7-2B9BF496E98F}" type="datetimeFigureOut">
               <a:rPr lang="ru-RU" smtClean="0"/>
-              <a:t>26.04.2021</a:t>
+              <a:t>19.10.2021</a:t>
             </a:fld>
             <a:endParaRPr lang="ru-RU"/>
           </a:p>
@@ -5096,7 +5096,7 @@
           <a:p>
             <a:fld id="{437E8BF7-1471-48EA-A6B7-2B9BF496E98F}" type="datetimeFigureOut">
               <a:rPr lang="ru-RU" smtClean="0"/>
-              <a:t>26.04.2021</a:t>
+              <a:t>19.10.2021</a:t>
             </a:fld>
             <a:endParaRPr lang="ru-RU"/>
           </a:p>
@@ -5369,7 +5369,7 @@
           <a:p>
             <a:fld id="{437E8BF7-1471-48EA-A6B7-2B9BF496E98F}" type="datetimeFigureOut">
               <a:rPr lang="ru-RU" smtClean="0"/>
-              <a:t>26.04.2021</a:t>
+              <a:t>19.10.2021</a:t>
             </a:fld>
             <a:endParaRPr lang="ru-RU"/>
           </a:p>
@@ -6044,34 +6044,6 @@
       </p:grpSpPr>
       <p:sp>
         <p:nvSpPr>
-          <p:cNvPr id="3" name="Подзаголовок 2"/>
-          <p:cNvSpPr>
-            <a:spLocks noGrp="1"/>
-          </p:cNvSpPr>
-          <p:nvPr>
-            <p:ph type="subTitle" idx="1"/>
-          </p:nvPr>
-        </p:nvSpPr>
-        <p:spPr>
-          <a:xfrm>
-            <a:off x="4788024" y="5733256"/>
-            <a:ext cx="4208512" cy="638944"/>
-          </a:xfrm>
-        </p:spPr>
-        <p:txBody>
-          <a:bodyPr/>
-          <a:lstStyle/>
-          <a:p>
-            <a:r>
-              <a:rPr lang="ru-RU" dirty="0" smtClean="0"/>
-              <a:t>Давыденко Григорий</a:t>
-            </a:r>
-            <a:endParaRPr lang="ru-RU" dirty="0"/>
-          </a:p>
-        </p:txBody>
-      </p:sp>
-      <p:sp>
-        <p:nvSpPr>
           <p:cNvPr id="2" name="Заголовок 1"/>
           <p:cNvSpPr>
             <a:spLocks noGrp="1"/>
@@ -6090,6 +6062,52 @@
               <a:t>Электронный журнал</a:t>
             </a:r>
             <a:endParaRPr lang="ru-RU" dirty="0"/>
+          </a:p>
+        </p:txBody>
+      </p:sp>
+      <p:sp>
+        <p:nvSpPr>
+          <p:cNvPr id="4" name="Заголовок 1"/>
+          <p:cNvSpPr txBox="1">
+            <a:spLocks/>
+          </p:cNvSpPr>
+          <p:nvPr/>
+        </p:nvSpPr>
+        <p:spPr>
+          <a:xfrm>
+            <a:off x="5508104" y="5805264"/>
+            <a:ext cx="3451920" cy="600472"/>
+          </a:xfrm>
+          <a:prstGeom prst="rect">
+            <a:avLst/>
+          </a:prstGeom>
+        </p:spPr>
+        <p:txBody>
+          <a:bodyPr vert="horz" anchor="b">
+            <a:normAutofit fontScale="77500" lnSpcReduction="20000"/>
+          </a:bodyPr>
+          <a:lstStyle>
+            <a:lvl1pPr algn="ctr" rtl="0" eaLnBrk="1" latinLnBrk="0" hangingPunct="1">
+              <a:spcBef>
+                <a:spcPct val="0"/>
+              </a:spcBef>
+              <a:buNone/>
+              <a:defRPr kumimoji="0" sz="4200" kern="1200">
+                <a:solidFill>
+                  <a:schemeClr val="accent1"/>
+                </a:solidFill>
+                <a:latin typeface="+mj-lt"/>
+                <a:ea typeface="+mj-ea"/>
+                <a:cs typeface="+mj-cs"/>
+              </a:defRPr>
+            </a:lvl1pPr>
+          </a:lstStyle>
+          <a:p>
+            <a:r>
+              <a:rPr lang="ru-RU" sz="3200" dirty="0" smtClean="0"/>
+              <a:t>Давыденко Григорий</a:t>
+            </a:r>
+            <a:endParaRPr lang="ru-RU" sz="3200" dirty="0"/>
           </a:p>
         </p:txBody>
       </p:sp>

</xml_diff>